<commit_message>
Hands On Demos - Day 3.
</commit_message>
<xml_diff>
--- a/2. Servlets and JSPs/Day 3/Slides/3. HTTP and the Tomcat Architecture/http-and-the-tomcat-architecture-slides.pptx
+++ b/2. Servlets and JSPs/Day 3/Slides/3. HTTP and the Tomcat Architecture/http-and-the-tomcat-architecture-slides.pptx
@@ -36682,7 +36682,7 @@
         <p:spPr>
           <a:xfrm>
             <a:off x="6731383" y="4254500"/>
-            <a:ext cx="3587750" cy="1872614"/>
+            <a:ext cx="3587750" cy="1871980"/>
           </a:xfrm>
           <a:prstGeom prst="rect">
             <a:avLst/>
@@ -36809,7 +36809,21 @@
                 <a:latin typeface="Verdana" panose="020B0604030504040204"/>
                 <a:cs typeface="Verdana" panose="020B0604030504040204"/>
               </a:rPr>
-              <a:t>destory()</a:t>
+              <a:t>dest</a:t>
+            </a:r>
+            <a:r>
+              <a:rPr lang="en-US" sz="1800" dirty="0">
+                <a:latin typeface="Verdana" panose="020B0604030504040204"/>
+                <a:cs typeface="Verdana" panose="020B0604030504040204"/>
+              </a:rPr>
+              <a:t>ro</a:t>
+            </a:r>
+            <a:r>
+              <a:rPr sz="1800" dirty="0">
+                <a:latin typeface="Verdana" panose="020B0604030504040204"/>
+                <a:cs typeface="Verdana" panose="020B0604030504040204"/>
+              </a:rPr>
+              <a:t>y()</a:t>
             </a:r>
             <a:endParaRPr sz="1800">
               <a:latin typeface="Verdana" panose="020B0604030504040204"/>

</xml_diff>